<commit_message>
Update slides with student-verifiable goals and actual implementation
Changes:
- Slide 9: Revised goals to be student-verifiable (no business efficiency metrics)
  - Goal 1: Support plan validity (70%+ of evaluation cases have valid support in top 3)
  - Goal 2: Similar case search validity (60%+ average similarity judgment by students)
- Slides 5-7: Updated responses to reference new student-verifiable goals
- Slide 25: Updated libraries to reflect actual implementation
  - Implemented: scikit-learn TF-IDF, cosine_similarity, pdfplumber, Flask, MySQL, openpyxl
  - Future candidates: sentence-transformers, faiss, pgvector
- Slide 26: Updated to show all 4 PDF sources (67 cases total)
  - Osaka University, Saitama City, NCGG, Kanagawa Prefecture

Co-Authored-By: nuanmeize70@gmail.com <c4p31017@bunkyo.ac.jp>
</commit_message>
<xml_diff>
--- a/SD-5.pptx
+++ b/SD-5.pptx
@@ -26031,275 +26031,59 @@
               <a:buSzPct val="100000"/>
               <a:buFont typeface="Arial"/>
               <a:buNone/>
-            </a:pPr>
-            <a:r>
-              <a:rPr b="0" i="0" lang="ja" sz="4300" u="none" cap="none" strike="noStrike">
-                <a:solidFill>
-                  <a:srgbClr val="000000"/>
-                </a:solidFill>
-                <a:latin typeface="Lato"/>
-                <a:ea typeface="Lato"/>
-                <a:cs typeface="Lato"/>
-                <a:sym typeface="Lato"/>
-              </a:rPr>
+              <a:defRPr sz="1200"/>
+            </a:pPr>
+            <a:r>
+              <a:t>【実装済み】</a:t>
+            </a:r>
+            <a:br/>
+            <a:r>
+              <a:t>テキスト処理：scikit-learn TF-IDF（文字n-gram 2〜4）</a:t>
+            </a:r>
+            <a:br/>
+            <a:r>
+              <a:t>類似度計算：sklearn.metrics.pairwise.cosine_similarity</a:t>
+            </a:r>
+            <a:br/>
+            <a:r>
+              <a:t>PDF解析：pdfplumber</a:t>
+            </a:r>
+            <a:br/>
+            <a:r>
+              <a:t>データ管理：MySQL + PyMySQL</a:t>
+            </a:r>
+            <a:br/>
+            <a:r>
+              <a:t>Webフレームワーク：Flask</a:t>
+            </a:r>
+            <a:br/>
+            <a:r>
+              <a:t>Excel出力：openpyxl</a:t>
+            </a:r>
+            <a:br/>
+            <a:r>
+              <a:t>データ処理：pandas, NumPy</a:t>
+            </a:r>
+            <a:br/>
+            <a:br/>
+            <a:r>
+              <a:t>【将来の拡張候補】</a:t>
+            </a:r>
+            <a:br/>
+            <a:r>
               <a:t>形態素解析：SudachiPy or MeCab</a:t>
+            </a:r>
+            <a:br/>
+            <a:r>
+              <a:t>埋め込み：sentence-transformers</a:t>
+            </a:r>
+            <a:br/>
+            <a:r>
+              <a:t>ベクトル検索：faiss or pgvector</a:t>
             </a:r>
             <a:endParaRPr b="0" i="0" sz="4300" u="none" cap="none" strike="noStrike">
               <a:solidFill>
                 <a:srgbClr val="000000"/>
-              </a:solidFill>
-              <a:latin typeface="Lato"/>
-              <a:ea typeface="Lato"/>
-              <a:cs typeface="Lato"/>
-              <a:sym typeface="Lato"/>
-            </a:endParaRPr>
-          </a:p>
-          <a:p>
-            <a:pPr indent="0" lvl="0" marL="0" marR="0" rtl="0" algn="l">
-              <a:lnSpc>
-                <a:spcPct val="115000"/>
-              </a:lnSpc>
-              <a:spcBef>
-                <a:spcPts val="1200"/>
-              </a:spcBef>
-              <a:spcAft>
-                <a:spcPts val="0"/>
-              </a:spcAft>
-              <a:buClr>
-                <a:srgbClr val="000000"/>
-              </a:buClr>
-              <a:buSzPct val="100000"/>
-              <a:buFont typeface="Arial"/>
-              <a:buNone/>
-            </a:pPr>
-            <a:r>
-              <a:rPr b="0" i="0" lang="ja" sz="4300" u="none" cap="none" strike="noStrike">
-                <a:solidFill>
-                  <a:srgbClr val="000000"/>
-                </a:solidFill>
-                <a:latin typeface="Lato"/>
-                <a:ea typeface="Lato"/>
-                <a:cs typeface="Lato"/>
-                <a:sym typeface="Lato"/>
-              </a:rPr>
-              <a:t>キーワード：scikit-learn(TF-IDF) + keybert</a:t>
-            </a:r>
-            <a:endParaRPr b="0" i="0" sz="4300" u="none" cap="none" strike="noStrike">
-              <a:solidFill>
-                <a:srgbClr val="000000"/>
-              </a:solidFill>
-              <a:latin typeface="Lato"/>
-              <a:ea typeface="Lato"/>
-              <a:cs typeface="Lato"/>
-              <a:sym typeface="Lato"/>
-            </a:endParaRPr>
-          </a:p>
-          <a:p>
-            <a:pPr indent="0" lvl="0" marL="0" marR="0" rtl="0" algn="l">
-              <a:lnSpc>
-                <a:spcPct val="115000"/>
-              </a:lnSpc>
-              <a:spcBef>
-                <a:spcPts val="1200"/>
-              </a:spcBef>
-              <a:spcAft>
-                <a:spcPts val="0"/>
-              </a:spcAft>
-              <a:buClr>
-                <a:srgbClr val="000000"/>
-              </a:buClr>
-              <a:buSzPct val="100000"/>
-              <a:buFont typeface="Arial"/>
-              <a:buNone/>
-            </a:pPr>
-            <a:r>
-              <a:rPr b="0" i="0" lang="ja" sz="4300" u="none" cap="none" strike="noStrike">
-                <a:solidFill>
-                  <a:srgbClr val="000000"/>
-                </a:solidFill>
-                <a:latin typeface="Lato"/>
-                <a:ea typeface="Lato"/>
-                <a:cs typeface="Lato"/>
-                <a:sym typeface="Lato"/>
-              </a:rPr>
-              <a:t>埋め込み：sentence-transformers</a:t>
-            </a:r>
-            <a:endParaRPr b="0" i="0" sz="4300" u="none" cap="none" strike="noStrike">
-              <a:solidFill>
-                <a:srgbClr val="000000"/>
-              </a:solidFill>
-              <a:latin typeface="Lato"/>
-              <a:ea typeface="Lato"/>
-              <a:cs typeface="Lato"/>
-              <a:sym typeface="Lato"/>
-            </a:endParaRPr>
-          </a:p>
-          <a:p>
-            <a:pPr indent="0" lvl="0" marL="0" marR="0" rtl="0" algn="l">
-              <a:lnSpc>
-                <a:spcPct val="115000"/>
-              </a:lnSpc>
-              <a:spcBef>
-                <a:spcPts val="1200"/>
-              </a:spcBef>
-              <a:spcAft>
-                <a:spcPts val="0"/>
-              </a:spcAft>
-              <a:buClr>
-                <a:srgbClr val="000000"/>
-              </a:buClr>
-              <a:buSzPct val="100000"/>
-              <a:buFont typeface="Arial"/>
-              <a:buNone/>
-            </a:pPr>
-            <a:r>
-              <a:rPr b="0" i="0" lang="ja" sz="4300" u="none" cap="none" strike="noStrike">
-                <a:solidFill>
-                  <a:srgbClr val="000000"/>
-                </a:solidFill>
-                <a:latin typeface="Lato"/>
-                <a:ea typeface="Lato"/>
-                <a:cs typeface="Lato"/>
-                <a:sym typeface="Lato"/>
-              </a:rPr>
-              <a:t>検索：faiss or pgvector</a:t>
-            </a:r>
-            <a:endParaRPr b="0" i="0" sz="4300" u="none" cap="none" strike="noStrike">
-              <a:solidFill>
-                <a:srgbClr val="000000"/>
-              </a:solidFill>
-              <a:latin typeface="Lato"/>
-              <a:ea typeface="Lato"/>
-              <a:cs typeface="Lato"/>
-              <a:sym typeface="Lato"/>
-            </a:endParaRPr>
-          </a:p>
-          <a:p>
-            <a:pPr indent="0" lvl="0" marL="0" marR="0" rtl="0" algn="l">
-              <a:lnSpc>
-                <a:spcPct val="115000"/>
-              </a:lnSpc>
-              <a:spcBef>
-                <a:spcPts val="1200"/>
-              </a:spcBef>
-              <a:spcAft>
-                <a:spcPts val="0"/>
-              </a:spcAft>
-              <a:buClr>
-                <a:srgbClr val="000000"/>
-              </a:buClr>
-              <a:buSzPct val="100000"/>
-              <a:buFont typeface="Arial"/>
-              <a:buNone/>
-            </a:pPr>
-            <a:r>
-              <a:rPr b="0" i="0" lang="ja" sz="4300" u="none" cap="none" strike="noStrike">
-                <a:solidFill>
-                  <a:srgbClr val="000000"/>
-                </a:solidFill>
-                <a:latin typeface="Lato"/>
-                <a:ea typeface="Lato"/>
-                <a:cs typeface="Lato"/>
-                <a:sym typeface="Lato"/>
-              </a:rPr>
-              <a:t>集計：pandas</a:t>
-            </a:r>
-            <a:endParaRPr b="0" i="0" sz="4300" u="none" cap="none" strike="noStrike">
-              <a:solidFill>
-                <a:srgbClr val="000000"/>
-              </a:solidFill>
-              <a:latin typeface="Lato"/>
-              <a:ea typeface="Lato"/>
-              <a:cs typeface="Lato"/>
-              <a:sym typeface="Lato"/>
-            </a:endParaRPr>
-          </a:p>
-          <a:p>
-            <a:pPr indent="0" lvl="0" marL="0" marR="0" rtl="0" algn="l">
-              <a:lnSpc>
-                <a:spcPct val="115000"/>
-              </a:lnSpc>
-              <a:spcBef>
-                <a:spcPts val="1200"/>
-              </a:spcBef>
-              <a:spcAft>
-                <a:spcPts val="0"/>
-              </a:spcAft>
-              <a:buClr>
-                <a:srgbClr val="000000"/>
-              </a:buClr>
-              <a:buSzPct val="100000"/>
-              <a:buFont typeface="Arial"/>
-              <a:buNone/>
-            </a:pPr>
-            <a:r>
-              <a:t/>
-            </a:r>
-            <a:endParaRPr b="1" i="0" sz="2300" u="none" cap="none" strike="noStrike">
-              <a:solidFill>
-                <a:srgbClr val="000000"/>
-              </a:solidFill>
-              <a:latin typeface="Arial"/>
-              <a:ea typeface="Arial"/>
-              <a:cs typeface="Arial"/>
-              <a:sym typeface="Arial"/>
-            </a:endParaRPr>
-          </a:p>
-          <a:p>
-            <a:pPr indent="0" lvl="0" marL="0" marR="0" rtl="0" algn="l">
-              <a:lnSpc>
-                <a:spcPct val="115000"/>
-              </a:lnSpc>
-              <a:spcBef>
-                <a:spcPts val="1200"/>
-              </a:spcBef>
-              <a:spcAft>
-                <a:spcPts val="0"/>
-              </a:spcAft>
-              <a:buClr>
-                <a:srgbClr val="000000"/>
-              </a:buClr>
-              <a:buSzPct val="100000"/>
-              <a:buFont typeface="Arial"/>
-              <a:buNone/>
-            </a:pPr>
-            <a:r>
-              <a:t/>
-            </a:r>
-            <a:endParaRPr b="1" i="0" sz="1300" u="none" cap="none" strike="noStrike">
-              <a:solidFill>
-                <a:srgbClr val="000000"/>
-              </a:solidFill>
-              <a:latin typeface="Arial"/>
-              <a:ea typeface="Arial"/>
-              <a:cs typeface="Arial"/>
-              <a:sym typeface="Arial"/>
-            </a:endParaRPr>
-          </a:p>
-          <a:p>
-            <a:pPr indent="0" lvl="0" marL="0" marR="0" rtl="0" algn="l">
-              <a:lnSpc>
-                <a:spcPct val="100000"/>
-              </a:lnSpc>
-              <a:spcBef>
-                <a:spcPts val="1200"/>
-              </a:spcBef>
-              <a:spcAft>
-                <a:spcPts val="0"/>
-              </a:spcAft>
-              <a:buClr>
-                <a:srgbClr val="000000"/>
-              </a:buClr>
-              <a:buSzPct val="100000"/>
-              <a:buFont typeface="Arial"/>
-              <a:buNone/>
-            </a:pPr>
-            <a:r>
-              <a:t/>
-            </a:r>
-            <a:endParaRPr b="0" i="0" sz="1300" u="none" cap="none" strike="noStrike">
-              <a:solidFill>
-                <a:schemeClr val="accent1"/>
               </a:solidFill>
               <a:latin typeface="Lato"/>
               <a:ea typeface="Lato"/>
@@ -26560,130 +26344,18 @@
               <a:buSzPts val="1600"/>
               <a:buFont typeface="Arial"/>
               <a:buNone/>
-            </a:pPr>
-            <a:r>
-              <a:rPr b="0" i="0" lang="ja" sz="1600" u="none" cap="none" strike="noStrike">
-                <a:solidFill>
-                  <a:schemeClr val="accent1"/>
-                </a:solidFill>
-                <a:latin typeface="Lato"/>
-                <a:ea typeface="Lato"/>
-                <a:cs typeface="Lato"/>
-                <a:sym typeface="Lato"/>
-              </a:rPr>
-              <a:t>主にこの二つの事例から</a:t>
-            </a:r>
-            <a:r>
-              <a:rPr b="1" i="0" lang="ja" sz="1600" u="none" cap="none" strike="noStrike">
-                <a:solidFill>
-                  <a:schemeClr val="accent1"/>
-                </a:solidFill>
-                <a:latin typeface="Lato"/>
-                <a:ea typeface="Lato"/>
-                <a:cs typeface="Lato"/>
-                <a:sym typeface="Lato"/>
-              </a:rPr>
-              <a:t>ケースの概要</a:t>
-            </a:r>
-            <a:r>
-              <a:rPr b="0" i="0" lang="ja" sz="1600" u="none" cap="none" strike="noStrike">
-                <a:solidFill>
-                  <a:schemeClr val="accent1"/>
-                </a:solidFill>
-                <a:latin typeface="Lato"/>
-                <a:ea typeface="Lato"/>
-                <a:cs typeface="Lato"/>
-                <a:sym typeface="Lato"/>
-              </a:rPr>
-              <a:t>や</a:t>
-            </a:r>
-            <a:r>
-              <a:rPr b="1" i="0" lang="ja" sz="1600" u="none" cap="none" strike="noStrike">
-                <a:solidFill>
-                  <a:schemeClr val="accent1"/>
-                </a:solidFill>
-                <a:latin typeface="Lato"/>
-                <a:ea typeface="Lato"/>
-                <a:cs typeface="Lato"/>
-                <a:sym typeface="Lato"/>
-              </a:rPr>
-              <a:t>支援内容</a:t>
-            </a:r>
-            <a:r>
-              <a:rPr b="0" i="0" lang="ja" sz="1600" u="none" cap="none" strike="noStrike">
-                <a:solidFill>
-                  <a:schemeClr val="accent1"/>
-                </a:solidFill>
-                <a:latin typeface="Lato"/>
-                <a:ea typeface="Lato"/>
-                <a:cs typeface="Lato"/>
-                <a:sym typeface="Lato"/>
-              </a:rPr>
-              <a:t>、</a:t>
-            </a:r>
-            <a:r>
-              <a:rPr b="1" i="0" lang="ja" sz="1600" u="none" cap="none" strike="noStrike">
-                <a:solidFill>
-                  <a:schemeClr val="accent1"/>
-                </a:solidFill>
-                <a:latin typeface="Lato"/>
-                <a:ea typeface="Lato"/>
-                <a:cs typeface="Lato"/>
-                <a:sym typeface="Lato"/>
-              </a:rPr>
-              <a:t>支援結果</a:t>
-            </a:r>
-            <a:r>
-              <a:rPr b="0" i="0" lang="ja" sz="1600" u="none" cap="none" strike="noStrike">
-                <a:solidFill>
-                  <a:schemeClr val="accent1"/>
-                </a:solidFill>
-                <a:latin typeface="Lato"/>
-                <a:ea typeface="Lato"/>
-                <a:cs typeface="Lato"/>
-                <a:sym typeface="Lato"/>
-              </a:rPr>
-              <a:t>を取得し、</a:t>
-            </a:r>
-            <a:endParaRPr b="0" i="0" sz="1600" u="none" cap="none" strike="noStrike">
-              <a:solidFill>
-                <a:schemeClr val="accent1"/>
-              </a:solidFill>
-              <a:latin typeface="Lato"/>
-              <a:ea typeface="Lato"/>
-              <a:cs typeface="Lato"/>
-              <a:sym typeface="Lato"/>
-            </a:endParaRPr>
-          </a:p>
-          <a:p>
-            <a:pPr indent="0" lvl="0" marL="0" marR="0" rtl="0" algn="l">
-              <a:lnSpc>
-                <a:spcPct val="100000"/>
-              </a:lnSpc>
-              <a:spcBef>
-                <a:spcPts val="0"/>
-              </a:spcBef>
-              <a:spcAft>
-                <a:spcPts val="0"/>
-              </a:spcAft>
-              <a:buClr>
-                <a:srgbClr val="000000"/>
-              </a:buClr>
-              <a:buSzPts val="1600"/>
-              <a:buFont typeface="Arial"/>
-              <a:buNone/>
-            </a:pPr>
-            <a:r>
-              <a:rPr b="0" i="0" lang="ja" sz="1600" u="none" cap="none" strike="noStrike">
-                <a:solidFill>
-                  <a:schemeClr val="accent1"/>
-                </a:solidFill>
-                <a:latin typeface="Lato"/>
-                <a:ea typeface="Lato"/>
-                <a:cs typeface="Lato"/>
-                <a:sym typeface="Lato"/>
-              </a:rPr>
-              <a:t>本システムのテキストマイニングで使用する</a:t>
+              <a:defRPr sz="1400"/>
+            </a:pPr>
+            <a:r>
+              <a:t>4つの事例集から67件のケースを抽出し、</a:t>
+            </a:r>
+            <a:br/>
+            <a:r>
+              <a:t>困難キーワード・支援キーワード・事例内容をJSON形式に構造化して</a:t>
+            </a:r>
+            <a:br/>
+            <a:r>
+              <a:t>本システムのテキストマイニングで使用しています。</a:t>
             </a:r>
             <a:endParaRPr b="0" i="0" sz="1600" u="none" cap="none" strike="noStrike">
               <a:solidFill>
@@ -26738,18 +26410,22 @@
               <a:buSzPts val="1900"/>
               <a:buFont typeface="Arial"/>
               <a:buNone/>
-            </a:pPr>
-            <a:r>
-              <a:rPr b="1" i="0" lang="ja" sz="1900" u="none" cap="none" strike="noStrike">
-                <a:solidFill>
-                  <a:srgbClr val="000000"/>
-                </a:solidFill>
-                <a:latin typeface="Arial"/>
-                <a:ea typeface="Arial"/>
-                <a:cs typeface="Arial"/>
-                <a:sym typeface="Arial"/>
-              </a:rPr>
-              <a:t>認知症初期集中支援チーム事例集</a:t>
+              <a:defRPr sz="1200"/>
+            </a:pPr>
+            <a:r>
+              <a:t>1. 大阪大学困難事例集</a:t>
+            </a:r>
+            <a:br/>
+            <a:r>
+              <a:t>2. さいたま市事例集</a:t>
+            </a:r>
+            <a:br/>
+            <a:r>
+              <a:t>3. 国立長寿医療研究センター事例集</a:t>
+            </a:r>
+            <a:br/>
+            <a:r>
+              <a:t>4. 神奈川県認知症初期集中支援チーム事例集</a:t>
             </a:r>
             <a:endParaRPr b="1" i="0" sz="1900" u="none" cap="none" strike="noStrike">
               <a:solidFill>
@@ -26759,128 +26435,6 @@
               <a:ea typeface="Arial"/>
               <a:cs typeface="Arial"/>
               <a:sym typeface="Arial"/>
-            </a:endParaRPr>
-          </a:p>
-          <a:p>
-            <a:pPr indent="0" lvl="0" marL="0" marR="0" rtl="0" algn="l">
-              <a:lnSpc>
-                <a:spcPct val="100000"/>
-              </a:lnSpc>
-              <a:spcBef>
-                <a:spcPts val="0"/>
-              </a:spcBef>
-              <a:spcAft>
-                <a:spcPts val="0"/>
-              </a:spcAft>
-              <a:buClr>
-                <a:srgbClr val="000000"/>
-              </a:buClr>
-              <a:buSzPts val="1900"/>
-              <a:buFont typeface="Arial"/>
-              <a:buNone/>
-            </a:pPr>
-            <a:r>
-              <a:rPr b="0" i="0" lang="ja" sz="1900" u="sng" cap="none" strike="noStrike">
-                <a:solidFill>
-                  <a:schemeClr val="hlink"/>
-                </a:solidFill>
-                <a:latin typeface="Lato"/>
-                <a:ea typeface="Lato"/>
-                <a:cs typeface="Lato"/>
-                <a:sym typeface="Lato"/>
-                <a:hlinkClick r:id="rId3"/>
-              </a:rPr>
-              <a:t>syokisyuutyuujireisyuu.pdf</a:t>
-            </a:r>
-            <a:endParaRPr b="0" i="0" sz="1900" u="none" cap="none" strike="noStrike">
-              <a:solidFill>
-                <a:schemeClr val="accent1"/>
-              </a:solidFill>
-              <a:latin typeface="Lato"/>
-              <a:ea typeface="Lato"/>
-              <a:cs typeface="Lato"/>
-              <a:sym typeface="Lato"/>
-            </a:endParaRPr>
-          </a:p>
-          <a:p>
-            <a:pPr indent="0" lvl="0" marL="0" marR="0" rtl="0" algn="l">
-              <a:lnSpc>
-                <a:spcPct val="100000"/>
-              </a:lnSpc>
-              <a:spcBef>
-                <a:spcPts val="0"/>
-              </a:spcBef>
-              <a:spcAft>
-                <a:spcPts val="0"/>
-              </a:spcAft>
-              <a:buClr>
-                <a:srgbClr val="000000"/>
-              </a:buClr>
-              <a:buSzPts val="1900"/>
-              <a:buFont typeface="Arial"/>
-              <a:buNone/>
-            </a:pPr>
-            <a:r>
-              <a:rPr b="1" i="0" lang="ja" sz="1900" u="none" cap="none" strike="noStrike">
-                <a:solidFill>
-                  <a:schemeClr val="dk2"/>
-                </a:solidFill>
-                <a:latin typeface="Lato"/>
-                <a:ea typeface="Lato"/>
-                <a:cs typeface="Lato"/>
-                <a:sym typeface="Lato"/>
-              </a:rPr>
-              <a:t>認知症初期集中支援推進事業 ケーススタディ</a:t>
-            </a:r>
-            <a:endParaRPr b="1" i="0" sz="1900" u="none" cap="none" strike="noStrike">
-              <a:solidFill>
-                <a:schemeClr val="dk2"/>
-              </a:solidFill>
-              <a:latin typeface="Lato"/>
-              <a:ea typeface="Lato"/>
-              <a:cs typeface="Lato"/>
-              <a:sym typeface="Lato"/>
-            </a:endParaRPr>
-          </a:p>
-          <a:p>
-            <a:pPr indent="0" lvl="0" marL="0" marR="0" rtl="0" algn="l">
-              <a:lnSpc>
-                <a:spcPct val="100000"/>
-              </a:lnSpc>
-              <a:spcBef>
-                <a:spcPts val="0"/>
-              </a:spcBef>
-              <a:spcAft>
-                <a:spcPts val="0"/>
-              </a:spcAft>
-              <a:buClr>
-                <a:srgbClr val="000000"/>
-              </a:buClr>
-              <a:buSzPts val="1900"/>
-              <a:buFont typeface="Arial"/>
-              <a:buNone/>
-            </a:pPr>
-            <a:r>
-              <a:rPr b="0" i="0" lang="ja" sz="1900" u="sng" cap="none" strike="noStrike">
-                <a:solidFill>
-                  <a:schemeClr val="hlink"/>
-                </a:solidFill>
-                <a:latin typeface="Lato"/>
-                <a:ea typeface="Lato"/>
-                <a:cs typeface="Lato"/>
-                <a:sym typeface="Lato"/>
-                <a:hlinkClick r:id="rId4"/>
-              </a:rPr>
-              <a:t>R3_Casestudies2.pdf</a:t>
-            </a:r>
-            <a:endParaRPr b="0" i="0" sz="1900" u="none" cap="none" strike="noStrike">
-              <a:solidFill>
-                <a:schemeClr val="accent1"/>
-              </a:solidFill>
-              <a:latin typeface="Lato"/>
-              <a:ea typeface="Lato"/>
-              <a:cs typeface="Lato"/>
-              <a:sym typeface="Lato"/>
             </a:endParaRPr>
           </a:p>
         </p:txBody>
@@ -28947,11 +28501,11 @@
             </a:r>
             <a:br/>
             <a:r>
-              <a:t>→ 「同一入力に対する再現性」は数値目標ではなく設計上の前提と位置付け直し、目標から削除しました。</a:t>
+              <a:t>→ 「同一入力に対する再現性」は数値目標ではなく設計上の前提と位置付け直しました。</a:t>
             </a:r>
             <a:br/>
             <a:r>
-              <a:t>　 代わりに、設計方針として「同一入力には常に同じ結果を返す決定論的な実装とする」と明記しました。(p.9)</a:t>
+              <a:t>　 目標からは削除し、設計方針として「決定論的な実装とする」と明記しました。(p.9)</a:t>
             </a:r>
             <a:br/>
             <a:br/>
@@ -28960,11 +28514,11 @@
             </a:r>
             <a:br/>
             <a:r>
-              <a:t>→ 類似度そのものを目標とするのではなく、「評価用ケースに対して、実際に有効だった支援内容が</a:t>
+              <a:t>→ 類似度の数値ではなく、「学生が妥当と判断した支援方針が上位3件に含まれる割合」と</a:t>
             </a:r>
             <a:br/>
             <a:r>
-              <a:t>　 上位候補に含まれる割合」を指標とするように目標を定義し直しました。(p.9)</a:t>
+              <a:t>　 「学生が類似と判断した事例の割合」という、学生が検証可能な指標に変更しました。(p.9)</a:t>
             </a:r>
             <a:br/>
             <a:br/>
@@ -28977,11 +28531,11 @@
             </a:r>
             <a:br/>
             <a:r>
-              <a:t>→ 「良い支援方針」を、対象者の状態と一貫性があり、ガイドラインに沿った支援内容で、</a:t>
+              <a:t>→ 業務効率は学生では検証できないため、本発表では「支援方針の質」に絞って評価を行います。</a:t>
             </a:r>
             <a:br/>
             <a:r>
-              <a:t>　 過去に肯定的な結果につながった方針に近いものと定義し、目標1（支援方針の妥当性）を設定しました。</a:t>
+              <a:t>　 「良い支援方針」を、事例集を参照して学生が妥当と判断できる支援内容と定義しました。</a:t>
             </a:r>
             <a:br/>
             <a:br/>
@@ -28998,15 +28552,7 @@
             </a:r>
             <a:br/>
             <a:r>
-              <a:t>→ スライド12で行政上の支援フローを示すとともに、「システム利用の流れ」として、</a:t>
-            </a:r>
-            <a:br/>
-            <a:r>
-              <a:t>　 誰がいつどの画面にどの情報を入力し、テキストマイニング結果をどのように活用するかを</a:t>
-            </a:r>
-            <a:br/>
-            <a:r>
-              <a:t>　 ストーリー形式で具体的に示しました。(p.12, 新規スライド参照)</a:t>
+              <a:t>→ スライド12で行政上の支援フローを示しています。(p.12)</a:t>
             </a:r>
             <a:br/>
             <a:br/>
@@ -29019,15 +28565,11 @@
             </a:r>
             <a:br/>
             <a:r>
-              <a:t>→ スライド22〜24で認知症状態評価とテキストマイニングの入出力例を示し、</a:t>
+              <a:t>→ スライド22〜24で入出力例を示しています。処理の流れ：入力テキスト→TF-IDF（文字n-gram 2〜4）</a:t>
             </a:r>
             <a:br/>
             <a:r>
-              <a:t>　 新規スライド「テキストマイニング処理の流れ」で、入力テキストを形態素解析・TF-IDF・</a:t>
-            </a:r>
-            <a:br/>
-            <a:r>
-              <a:t>　 コサイン類似度計算でどのように処理し、最終的にどの情報を出力するかを図解しました。(p.22-24)</a:t>
+              <a:t>　 →コサイン類似度計算→上位10件の類似事例と支援方針を出力。(p.22-24)</a:t>
             </a:r>
             <a:endParaRPr b="0" i="0" sz="1100" u="none" cap="none" strike="noStrike">
               <a:solidFill>
@@ -29245,15 +28787,15 @@
             </a:r>
             <a:br/>
             <a:r>
-              <a:t>→ 新規スライドで、キーワードレベルで明確に書かれている症状・生活状況の違いなど「判定しやすい点」と、</a:t>
+              <a:t>→ 判定しやすい点：キーワードレベルで明確に書かれている症状（妄想、徘徊等）、生活状況（独居、老老介護等）</a:t>
             </a:r>
             <a:br/>
             <a:r>
-              <a:t>　 心理的ニュアンスなど「判定しにくい点」を具体例付きで整理し、TF-IDF＋コサイン類似度検索で</a:t>
+              <a:t>　 判定しにくい点：心理的ニュアンス、文脈に依存する意味、暗黙の前提</a:t>
             </a:r>
             <a:br/>
             <a:r>
-              <a:t>　 カバーできる範囲と限界を説明しました。(新規スライド「判定できる違い・できない違い」参照)</a:t>
+              <a:t>　 TF-IDF＋コサイン類似度は「単語の出現パターンの類似性」を測るため、明示的なキーワードの一致に強い。</a:t>
             </a:r>
             <a:br/>
             <a:br/>
@@ -29266,19 +28808,15 @@
             </a:r>
             <a:br/>
             <a:r>
-              <a:t>→ 67件という少量データであることを前提に、事例の一部を評価用として除外し、</a:t>
+              <a:t>→ 67件という少量データを前提に、評価用ケースを選定し、学生による妥当性判断で評価を行います。</a:t>
             </a:r>
             <a:br/>
             <a:r>
-              <a:t>　 上位3件に実際の支援内容に近い事例が含まれる割合を測定する評価手順をスライドで明示しました。</a:t>
+              <a:t>　 現在の実装：4つの事例集（大阪大学、さいたま市、国立長寿医療研究センター、神奈川県）から</a:t>
             </a:r>
             <a:br/>
             <a:r>
-              <a:t>　 現在の実装では、4つの事例集（大阪大学困難事例集、さいたま市事例集、国立長寿医療研究センター事例集、</a:t>
-            </a:r>
-            <a:br/>
-            <a:r>
-              <a:t>　 神奈川県事例集）から67件の事例を抽出し、TF-IDFベースの類似検索を実装済みです。(評価スライド参照)</a:t>
+              <a:t>　 67件を抽出済み。評価計画に基づき、目標達成状況を報告予定です。(p.25-26, 評価スライド参照)</a:t>
             </a:r>
             <a:br/>
             <a:br/>
@@ -29287,7 +28825,7 @@
             </a:r>
             <a:br/>
             <a:r>
-              <a:t>→ TF-IDF計算では、文字n-gram（2〜4文字）を使用して文書を特徴量化しています。</a:t>
+              <a:t>→ 文字n-gram（2〜4文字）を使用。形態素解析なしで日本語テキストの特徴を捉えます。</a:t>
             </a:r>
             <a:br/>
             <a:r>
@@ -29295,11 +28833,7 @@
             </a:r>
             <a:br/>
             <a:r>
-              <a:t>　 「判断・支援内容」などのテキストを結合し、1つの文書として扱います。</a:t>
-            </a:r>
-            <a:br/>
-            <a:r>
-              <a:t>　 この方法により、形態素解析なしでも日本語テキストの特徴を捉えることができます。(処理フロースライド参照)</a:t>
+              <a:t>　 「判断・支援内容」を結合し、1つの文書として扱います。max_features=1000で特徴量を制限。</a:t>
             </a:r>
             <a:endParaRPr b="0" i="0" sz="1100" u="none" cap="none" strike="noStrike">
               <a:solidFill>
@@ -29504,15 +29038,11 @@
             </a:r>
             <a:br/>
             <a:r>
-              <a:t>→ テキストマイニングでは、4つのPDF事例集から困難キーワード・支援キーワード・事例内容を抽出し、</a:t>
+              <a:t>→ データ加工の流れ：PDF事例集→pdfplumberでテキスト抽出→正規表現で困難キーワード・支援キーワード・</a:t>
             </a:r>
             <a:br/>
             <a:r>
-              <a:t>　 JSON形式に構造化した上で、TF-IDF（文字n-gram 2〜4）により各事例をベクトル化して</a:t>
-            </a:r>
-            <a:br/>
-            <a:r>
-              <a:t>　 類似検索用のインデックスを構築するという「データ加工〜学習」の流れをスライドで説明しました。(新規スライド参照)</a:t>
+              <a:t>　 事例内容を抽出→JSON形式に構造化→TF-IDF（文字n-gram 2〜4）でベクトル化→類似検索用に使用。(p.25-26)</a:t>
             </a:r>
             <a:br/>
             <a:br/>
@@ -29521,11 +29051,11 @@
             </a:r>
             <a:br/>
             <a:r>
-              <a:t>→ テキストマイニング機能について、評価用データを用いた類似事例検索の達成率を測定する</a:t>
+              <a:t>→ 評価計画：評価用ケース10〜20件を選定し、学生が類似事例検索結果の妥当性を判断。</a:t>
             </a:r>
             <a:br/>
             <a:r>
-              <a:t>　 評価手順と結果をまとめたスライドを追加し、目標1に対する達成状況を報告できるようにしました。(評価スライド参照)</a:t>
+              <a:t>　 目標1（支援方針の妥当性70%以上）、目標2（類似事例の妥当性60%以上）の達成状況を報告予定。</a:t>
             </a:r>
             <a:br/>
             <a:br/>
@@ -29534,15 +29064,11 @@
             </a:r>
             <a:br/>
             <a:r>
-              <a:t>→ 「目標1（支援方針の妥当性）」と「目標2（業務効率）」それぞれに対して、</a:t>
+              <a:t>→ 目標1・2の達成に貢献する技術要素：scikit-learn TF-IDF（類似検索）、Flask（Webアプリ）、</a:t>
             </a:r>
             <a:br/>
             <a:r>
-              <a:t>　 どの技術要素（TF-IDF、Flask、MySQL、Excel自動生成等）がどのように目的達成に貢献するかを</a:t>
-            </a:r>
-            <a:br/>
-            <a:r>
-              <a:t>　 対応付けたスライドを追加しました。(新規スライド「目標と技術要素の対応」参照)</a:t>
+              <a:t>　 MySQL（データ管理）、pdfplumber（PDF解析）、openpyxl（Excel出力）。(p.25)</a:t>
             </a:r>
             <a:br/>
             <a:br/>
@@ -29555,15 +29081,7 @@
             </a:r>
             <a:br/>
             <a:r>
-              <a:t>→ スライド24で、実際の事例集をもとにした入力テキストと、それに対して本システムが出力する</a:t>
-            </a:r>
-            <a:br/>
-            <a:r>
-              <a:t>　 類似事例の「判断・支援内容」の具体例を示し、「入力データ→TF-IDF処理→出力データ」の</a:t>
-            </a:r>
-            <a:br/>
-            <a:r>
-              <a:t>　 一連の流れを説明しました。発表時には同様のデータを用いた簡単なデモも行う予定です。(p.24)</a:t>
+              <a:t>→ スライド24で入出力例を示しています。発表時にはデモも行う予定です。(p.24)</a:t>
             </a:r>
             <a:endParaRPr b="0" i="0" sz="1100" u="none" cap="none" strike="noStrike">
               <a:solidFill>
@@ -31651,24 +31169,32 @@
             </a:r>
             <a:br/>
             <a:r>
-              <a:t>評価用ケースを入力した際、実際に有効だった支援内容が</a:t>
+              <a:t>評価用ケース（10〜20件）について、類似事例検索を行い、</a:t>
             </a:r>
             <a:br/>
             <a:r>
-              <a:t>類似事例の上位3件に含まれる割合を80%以上とする。</a:t>
+              <a:t>学生が「妥当な支援方針が含まれている」と判断した事例が</a:t>
+            </a:r>
+            <a:br/>
+            <a:r>
+              <a:t>上位3件以内に含まれる割合を70%以上とする。</a:t>
             </a:r>
             <a:br/>
             <a:br/>
             <a:r>
-              <a:t>【目標2：業務効率の向上】</a:t>
+              <a:t>【目標2：類似事例検索の妥当性】</a:t>
             </a:r>
             <a:br/>
             <a:r>
-              <a:t>アセスメントシートの作成・共有にかかる時間を、</a:t>
+              <a:t>評価用ケースについて、上位5件の検索結果のうち、</a:t>
             </a:r>
             <a:br/>
             <a:r>
-              <a:t>従来のExcel運用と比較して20%以上削減する。</a:t>
+              <a:t>学生が「状況が類似している」と判断した事例の</a:t>
+            </a:r>
+            <a:br/>
+            <a:r>
+              <a:t>割合の平均を60%以上とする。</a:t>
             </a:r>
             <a:endParaRPr sz="1600">
               <a:solidFill>

</xml_diff>